<commit_message>
updated lectures 4, 5
</commit_message>
<xml_diff>
--- a/Win2018/assets/lecture4/lecture4.pptx
+++ b/Win2018/assets/lecture4/lecture4.pptx
@@ -197,7 +197,7 @@
           <a:p>
             <a:fld id="{105AC71C-0662-E043-AC72-3255BC99F799}" type="datetimeFigureOut">
               <a:rPr lang="en-US" smtClean="0"/>
-              <a:t>1/25/18</a:t>
+              <a:t>1/26/18</a:t>
             </a:fld>
             <a:endParaRPr lang="en-US"/>
           </a:p>
@@ -595,7 +595,7 @@
           <a:p>
             <a:fld id="{B2DDCCA5-40EF-9A45-AE4D-E3567D1F429F}" type="datetimeFigureOut">
               <a:rPr lang="en-US" smtClean="0"/>
-              <a:t>1/25/18</a:t>
+              <a:t>1/26/18</a:t>
             </a:fld>
             <a:endParaRPr lang="en-US"/>
           </a:p>
@@ -760,7 +760,7 @@
           <a:p>
             <a:fld id="{B2DDCCA5-40EF-9A45-AE4D-E3567D1F429F}" type="datetimeFigureOut">
               <a:rPr lang="en-US" smtClean="0"/>
-              <a:t>1/25/18</a:t>
+              <a:t>1/26/18</a:t>
             </a:fld>
             <a:endParaRPr lang="en-US"/>
           </a:p>
@@ -935,7 +935,7 @@
           <a:p>
             <a:fld id="{B2DDCCA5-40EF-9A45-AE4D-E3567D1F429F}" type="datetimeFigureOut">
               <a:rPr lang="en-US" smtClean="0"/>
-              <a:t>1/25/18</a:t>
+              <a:t>1/26/18</a:t>
             </a:fld>
             <a:endParaRPr lang="en-US"/>
           </a:p>
@@ -1100,7 +1100,7 @@
           <a:p>
             <a:fld id="{B2DDCCA5-40EF-9A45-AE4D-E3567D1F429F}" type="datetimeFigureOut">
               <a:rPr lang="en-US" smtClean="0"/>
-              <a:t>1/25/18</a:t>
+              <a:t>1/26/18</a:t>
             </a:fld>
             <a:endParaRPr lang="en-US"/>
           </a:p>
@@ -1339,7 +1339,7 @@
           <a:p>
             <a:fld id="{B2DDCCA5-40EF-9A45-AE4D-E3567D1F429F}" type="datetimeFigureOut">
               <a:rPr lang="en-US" smtClean="0"/>
-              <a:t>1/25/18</a:t>
+              <a:t>1/26/18</a:t>
             </a:fld>
             <a:endParaRPr lang="en-US"/>
           </a:p>
@@ -1566,7 +1566,7 @@
           <a:p>
             <a:fld id="{B2DDCCA5-40EF-9A45-AE4D-E3567D1F429F}" type="datetimeFigureOut">
               <a:rPr lang="en-US" smtClean="0"/>
-              <a:t>1/25/18</a:t>
+              <a:t>1/26/18</a:t>
             </a:fld>
             <a:endParaRPr lang="en-US"/>
           </a:p>
@@ -1928,7 +1928,7 @@
           <a:p>
             <a:fld id="{B2DDCCA5-40EF-9A45-AE4D-E3567D1F429F}" type="datetimeFigureOut">
               <a:rPr lang="en-US" smtClean="0"/>
-              <a:t>1/25/18</a:t>
+              <a:t>1/26/18</a:t>
             </a:fld>
             <a:endParaRPr lang="en-US"/>
           </a:p>
@@ -2041,7 +2041,7 @@
           <a:p>
             <a:fld id="{B2DDCCA5-40EF-9A45-AE4D-E3567D1F429F}" type="datetimeFigureOut">
               <a:rPr lang="en-US" smtClean="0"/>
-              <a:t>1/25/18</a:t>
+              <a:t>1/26/18</a:t>
             </a:fld>
             <a:endParaRPr lang="en-US"/>
           </a:p>
@@ -2131,7 +2131,7 @@
           <a:p>
             <a:fld id="{B2DDCCA5-40EF-9A45-AE4D-E3567D1F429F}" type="datetimeFigureOut">
               <a:rPr lang="en-US" smtClean="0"/>
-              <a:t>1/25/18</a:t>
+              <a:t>1/26/18</a:t>
             </a:fld>
             <a:endParaRPr lang="en-US"/>
           </a:p>
@@ -2403,7 +2403,7 @@
           <a:p>
             <a:fld id="{B2DDCCA5-40EF-9A45-AE4D-E3567D1F429F}" type="datetimeFigureOut">
               <a:rPr lang="en-US" smtClean="0"/>
-              <a:t>1/25/18</a:t>
+              <a:t>1/26/18</a:t>
             </a:fld>
             <a:endParaRPr lang="en-US"/>
           </a:p>
@@ -2655,7 +2655,7 @@
           <a:p>
             <a:fld id="{B2DDCCA5-40EF-9A45-AE4D-E3567D1F429F}" type="datetimeFigureOut">
               <a:rPr lang="en-US" smtClean="0"/>
-              <a:t>1/25/18</a:t>
+              <a:t>1/26/18</a:t>
             </a:fld>
             <a:endParaRPr lang="en-US"/>
           </a:p>
@@ -2863,7 +2863,7 @@
           <a:p>
             <a:fld id="{B2DDCCA5-40EF-9A45-AE4D-E3567D1F429F}" type="datetimeFigureOut">
               <a:rPr lang="en-US" smtClean="0"/>
-              <a:t>1/25/18</a:t>
+              <a:t>1/26/18</a:t>
             </a:fld>
             <a:endParaRPr lang="en-US"/>
           </a:p>
@@ -3465,11 +3465,11 @@
             <a:pPr algn="ctr"/>
             <a:r>
               <a:rPr lang="en-US" i="1" dirty="0" err="1"/>
-              <a:t>Z</a:t>
+              <a:t>z</a:t>
             </a:r>
             <a:r>
               <a:rPr lang="en-US" i="1" baseline="-25000" dirty="0" err="1"/>
-              <a:t>m</a:t>
+              <a:t>i</a:t>
             </a:r>
             <a:endParaRPr lang="en-US" i="1" dirty="0"/>
           </a:p>
@@ -3562,11 +3562,11 @@
             <a:pPr algn="ctr"/>
             <a:r>
               <a:rPr lang="en-US" i="1" dirty="0" err="1"/>
-              <a:t>V</a:t>
+              <a:t>y</a:t>
             </a:r>
             <a:r>
               <a:rPr lang="en-US" i="1" baseline="-25000" dirty="0" err="1"/>
-              <a:t>m</a:t>
+              <a:t>i</a:t>
             </a:r>
             <a:endParaRPr lang="en-US" i="1" dirty="0"/>
           </a:p>
@@ -3692,11 +3692,11 @@
             <a:pPr algn="ctr"/>
             <a:r>
               <a:rPr lang="en-US" i="1" dirty="0" err="1"/>
-              <a:t>X</a:t>
+              <a:t>s</a:t>
             </a:r>
             <a:r>
               <a:rPr lang="en-US" i="1" baseline="-25000" dirty="0" err="1"/>
-              <a:t>n</a:t>
+              <a:t>i</a:t>
             </a:r>
             <a:endParaRPr lang="en-US" i="1" dirty="0"/>
           </a:p>
@@ -3745,11 +3745,11 @@
             <a:pPr algn="ctr"/>
             <a:r>
               <a:rPr lang="en-US" i="1" dirty="0" err="1"/>
-              <a:t>Y</a:t>
+              <a:t>u</a:t>
             </a:r>
             <a:r>
               <a:rPr lang="en-US" i="1" baseline="-25000" dirty="0" err="1"/>
-              <a:t>n</a:t>
+              <a:t>i</a:t>
             </a:r>
             <a:endParaRPr lang="en-US" i="1" dirty="0"/>
           </a:p>

</xml_diff>